<commit_message>
Suppression du déplacement en diagonale
</commit_message>
<xml_diff>
--- a/Simulateur-de-foule.pptx
+++ b/Simulateur-de-foule.pptx
@@ -108,6 +108,11 @@
       </a:defRPr>
     </a:lvl9pPr>
   </p:defaultTextStyle>
+  <p:extLst>
+    <p:ext uri="{EFAFB233-063F-42B5-8137-9DF3F51BA10A}">
+      <p15:sldGuideLst xmlns:p15="http://schemas.microsoft.com/office/powerpoint/2012/main"/>
+    </p:ext>
+  </p:extLst>
 </p:presentation>
 </file>
 
@@ -299,7 +304,7 @@
           <a:p>
             <a:fld id="{98109B11-D7DF-4FEE-A375-C4D4B9782FB9}" type="datetimeFigureOut">
               <a:rPr lang="fr-FR" smtClean="0"/>
-              <a:t>19/11/2015</a:t>
+              <a:t>20/11/2015</a:t>
             </a:fld>
             <a:endParaRPr lang="fr-FR"/>
           </a:p>
@@ -637,7 +642,7 @@
           <a:p>
             <a:fld id="{98109B11-D7DF-4FEE-A375-C4D4B9782FB9}" type="datetimeFigureOut">
               <a:rPr lang="fr-FR" smtClean="0"/>
-              <a:t>19/11/2015</a:t>
+              <a:t>20/11/2015</a:t>
             </a:fld>
             <a:endParaRPr lang="fr-FR"/>
           </a:p>
@@ -1038,7 +1043,7 @@
           <a:p>
             <a:fld id="{98109B11-D7DF-4FEE-A375-C4D4B9782FB9}" type="datetimeFigureOut">
               <a:rPr lang="fr-FR" smtClean="0"/>
-              <a:t>19/11/2015</a:t>
+              <a:t>20/11/2015</a:t>
             </a:fld>
             <a:endParaRPr lang="fr-FR"/>
           </a:p>
@@ -1374,7 +1379,7 @@
           <a:p>
             <a:fld id="{98109B11-D7DF-4FEE-A375-C4D4B9782FB9}" type="datetimeFigureOut">
               <a:rPr lang="fr-FR" smtClean="0"/>
-              <a:t>19/11/2015</a:t>
+              <a:t>20/11/2015</a:t>
             </a:fld>
             <a:endParaRPr lang="fr-FR"/>
           </a:p>
@@ -1694,7 +1699,7 @@
           <a:p>
             <a:fld id="{98109B11-D7DF-4FEE-A375-C4D4B9782FB9}" type="datetimeFigureOut">
               <a:rPr lang="fr-FR" smtClean="0"/>
-              <a:t>19/11/2015</a:t>
+              <a:t>20/11/2015</a:t>
             </a:fld>
             <a:endParaRPr lang="fr-FR"/>
           </a:p>
@@ -2090,7 +2095,7 @@
           <a:p>
             <a:fld id="{98109B11-D7DF-4FEE-A375-C4D4B9782FB9}" type="datetimeFigureOut">
               <a:rPr lang="fr-FR" smtClean="0"/>
-              <a:t>19/11/2015</a:t>
+              <a:t>20/11/2015</a:t>
             </a:fld>
             <a:endParaRPr lang="fr-FR"/>
           </a:p>
@@ -2347,7 +2352,7 @@
           <a:p>
             <a:fld id="{98109B11-D7DF-4FEE-A375-C4D4B9782FB9}" type="datetimeFigureOut">
               <a:rPr lang="fr-FR" smtClean="0"/>
-              <a:t>19/11/2015</a:t>
+              <a:t>20/11/2015</a:t>
             </a:fld>
             <a:endParaRPr lang="fr-FR"/>
           </a:p>
@@ -2609,7 +2614,7 @@
           <a:p>
             <a:fld id="{98109B11-D7DF-4FEE-A375-C4D4B9782FB9}" type="datetimeFigureOut">
               <a:rPr lang="fr-FR" smtClean="0"/>
-              <a:t>19/11/2015</a:t>
+              <a:t>20/11/2015</a:t>
             </a:fld>
             <a:endParaRPr lang="fr-FR"/>
           </a:p>
@@ -2871,7 +2876,7 @@
           <a:p>
             <a:fld id="{98109B11-D7DF-4FEE-A375-C4D4B9782FB9}" type="datetimeFigureOut">
               <a:rPr lang="fr-FR" smtClean="0"/>
-              <a:t>19/11/2015</a:t>
+              <a:t>20/11/2015</a:t>
             </a:fld>
             <a:endParaRPr lang="fr-FR"/>
           </a:p>
@@ -3200,7 +3205,7 @@
           <a:p>
             <a:fld id="{98109B11-D7DF-4FEE-A375-C4D4B9782FB9}" type="datetimeFigureOut">
               <a:rPr lang="fr-FR" smtClean="0"/>
-              <a:t>19/11/2015</a:t>
+              <a:t>20/11/2015</a:t>
             </a:fld>
             <a:endParaRPr lang="fr-FR"/>
           </a:p>
@@ -3523,7 +3528,7 @@
           <a:p>
             <a:fld id="{98109B11-D7DF-4FEE-A375-C4D4B9782FB9}" type="datetimeFigureOut">
               <a:rPr lang="fr-FR" smtClean="0"/>
-              <a:t>19/11/2015</a:t>
+              <a:t>20/11/2015</a:t>
             </a:fld>
             <a:endParaRPr lang="fr-FR"/>
           </a:p>
@@ -3980,7 +3985,7 @@
           <a:p>
             <a:fld id="{98109B11-D7DF-4FEE-A375-C4D4B9782FB9}" type="datetimeFigureOut">
               <a:rPr lang="fr-FR" smtClean="0"/>
-              <a:t>19/11/2015</a:t>
+              <a:t>20/11/2015</a:t>
             </a:fld>
             <a:endParaRPr lang="fr-FR"/>
           </a:p>
@@ -4185,7 +4190,7 @@
           <a:p>
             <a:fld id="{98109B11-D7DF-4FEE-A375-C4D4B9782FB9}" type="datetimeFigureOut">
               <a:rPr lang="fr-FR" smtClean="0"/>
-              <a:t>19/11/2015</a:t>
+              <a:t>20/11/2015</a:t>
             </a:fld>
             <a:endParaRPr lang="fr-FR"/>
           </a:p>
@@ -4362,7 +4367,7 @@
           <a:p>
             <a:fld id="{98109B11-D7DF-4FEE-A375-C4D4B9782FB9}" type="datetimeFigureOut">
               <a:rPr lang="fr-FR" smtClean="0"/>
-              <a:t>19/11/2015</a:t>
+              <a:t>20/11/2015</a:t>
             </a:fld>
             <a:endParaRPr lang="fr-FR"/>
           </a:p>
@@ -4695,7 +4700,7 @@
           <a:p>
             <a:fld id="{98109B11-D7DF-4FEE-A375-C4D4B9782FB9}" type="datetimeFigureOut">
               <a:rPr lang="fr-FR" smtClean="0"/>
-              <a:t>19/11/2015</a:t>
+              <a:t>20/11/2015</a:t>
             </a:fld>
             <a:endParaRPr lang="fr-FR"/>
           </a:p>
@@ -5040,7 +5045,7 @@
           <a:p>
             <a:fld id="{98109B11-D7DF-4FEE-A375-C4D4B9782FB9}" type="datetimeFigureOut">
               <a:rPr lang="fr-FR" smtClean="0"/>
-              <a:t>19/11/2015</a:t>
+              <a:t>20/11/2015</a:t>
             </a:fld>
             <a:endParaRPr lang="fr-FR"/>
           </a:p>
@@ -7157,7 +7162,7 @@
           <a:p>
             <a:fld id="{98109B11-D7DF-4FEE-A375-C4D4B9782FB9}" type="datetimeFigureOut">
               <a:rPr lang="fr-FR" smtClean="0"/>
-              <a:t>19/11/2015</a:t>
+              <a:t>20/11/2015</a:t>
             </a:fld>
             <a:endParaRPr lang="fr-FR"/>
           </a:p>
@@ -7883,13 +7888,6 @@
               </a:rPr>
               <a:t>Java</a:t>
             </a:r>
-            <a:endParaRPr lang="fr-FR" sz="5400" b="1" dirty="0">
-              <a:solidFill>
-                <a:schemeClr val="accent1">
-                  <a:lumMod val="75000"/>
-                </a:schemeClr>
-              </a:solidFill>
-            </a:endParaRPr>
           </a:p>
         </p:txBody>
       </p:sp>
@@ -7994,13 +7992,6 @@
               </a:rPr>
               <a:t>Algorithme de Dijkstra</a:t>
             </a:r>
-            <a:endParaRPr lang="fr-FR" sz="5400" b="1" dirty="0">
-              <a:solidFill>
-                <a:schemeClr val="accent1">
-                  <a:lumMod val="75000"/>
-                </a:schemeClr>
-              </a:solidFill>
-            </a:endParaRPr>
           </a:p>
         </p:txBody>
       </p:sp>
@@ -8093,13 +8084,6 @@
               </a:rPr>
               <a:t>Architecture du projet</a:t>
             </a:r>
-            <a:endParaRPr lang="fr-FR" sz="5400" b="1" dirty="0">
-              <a:solidFill>
-                <a:schemeClr val="accent1">
-                  <a:lumMod val="75000"/>
-                </a:schemeClr>
-              </a:solidFill>
-            </a:endParaRPr>
           </a:p>
         </p:txBody>
       </p:sp>
@@ -8792,13 +8776,6 @@
               </a:rPr>
               <a:t>Attributs</a:t>
             </a:r>
-            <a:endParaRPr lang="fr-FR" sz="5400" b="1" dirty="0">
-              <a:solidFill>
-                <a:schemeClr val="accent1">
-                  <a:lumMod val="75000"/>
-                </a:schemeClr>
-              </a:solidFill>
-            </a:endParaRPr>
           </a:p>
         </p:txBody>
       </p:sp>
@@ -8832,8 +8809,24 @@
               <a:t>Classe Path : </a:t>
             </a:r>
             <a:r>
+              <a:rPr lang="fr-FR" dirty="0" err="1"/>
+              <a:t>Cost</a:t>
+            </a:r>
+            <a:r>
               <a:rPr lang="fr-FR" dirty="0"/>
-              <a:t>Cost </a:t>
+              <a:t> </a:t>
+            </a:r>
+            <a:r>
+              <a:rPr lang="fr-FR" dirty="0" smtClean="0"/>
+              <a:t>&amp; antécédent + poids (</a:t>
+            </a:r>
+            <a:r>
+              <a:rPr lang="fr-FR" dirty="0" err="1" smtClean="0"/>
+              <a:t>Dijsktra</a:t>
+            </a:r>
+            <a:r>
+              <a:rPr lang="fr-FR" smtClean="0"/>
+              <a:t>)</a:t>
             </a:r>
             <a:endParaRPr lang="fr-FR" dirty="0" smtClean="0"/>
           </a:p>

</xml_diff>